<commit_message>
Update Great_Outdoor Group B Prafull .pptx
</commit_message>
<xml_diff>
--- a/Presentation/Great_Outdoor Group B Prafull .pptx
+++ b/Presentation/Great_Outdoor Group B Prafull .pptx
@@ -12,7 +12,8 @@
     <p:sldId id="258" r:id="rId9"/>
     <p:sldId id="259" r:id="rId10"/>
     <p:sldId id="260" r:id="rId11"/>
-    <p:sldId id="262" r:id="rId12"/>
+    <p:sldId id="264" r:id="rId12"/>
+    <p:sldId id="262" r:id="rId13"/>
   </p:sldIdLst>
   <p:sldSz cx="12192000" cy="6858000"/>
   <p:notesSz cx="6858000" cy="9144000"/>
@@ -111,6 +112,11 @@
       </a:defRPr>
     </a:lvl9pPr>
   </p:defaultTextStyle>
+  <p:extLst>
+    <p:ext uri="{EFAFB233-063F-42B5-8137-9DF3F51BA10A}">
+      <p15:sldGuideLst xmlns:p15="http://schemas.microsoft.com/office/powerpoint/2012/main"/>
+    </p:ext>
+  </p:extLst>
 </p:presentation>
 </file>
 
@@ -118,12 +124,68 @@
 <p1510:revInfo xmlns:a="http://schemas.openxmlformats.org/drawingml/2006/main" xmlns:r="http://schemas.openxmlformats.org/officeDocument/2006/relationships" xmlns:p1510="http://schemas.microsoft.com/office/powerpoint/2015/10/main">
   <p1510:revLst>
     <p1510:client id="{43C3D700-A46E-4C7D-896D-F303ADE50D45}" v="6" dt="2019-09-15T09:04:50.223"/>
+    <p1510:client id="{5B2918AB-ACD9-4AC8-8541-F71793DE81EB}" v="6" dt="2019-09-15T12:34:44.414"/>
   </p1510:revLst>
 </p1510:revInfo>
 </file>
 
 <file path=ppt/changesInfos/changesInfo1.xml><?xml version="1.0" encoding="utf-8"?>
 <pc:chgInfo xmlns:a="http://schemas.openxmlformats.org/drawingml/2006/main" xmlns:r="http://schemas.openxmlformats.org/officeDocument/2006/relationships" xmlns:ac="http://schemas.microsoft.com/office/drawing/2013/main/command" xmlns:pc="http://schemas.microsoft.com/office/powerpoint/2013/main/command">
+  <pc:docChgLst>
+    <pc:chgData name="Office2072" userId="52a5ddc4-b969-43fa-a50f-5e0a92d364aa" providerId="ADAL" clId="{5B2918AB-ACD9-4AC8-8541-F71793DE81EB}"/>
+    <pc:docChg chg="custSel addSld modSld">
+      <pc:chgData name="Office2072" userId="52a5ddc4-b969-43fa-a50f-5e0a92d364aa" providerId="ADAL" clId="{5B2918AB-ACD9-4AC8-8541-F71793DE81EB}" dt="2019-09-15T12:35:28.503" v="69" actId="27636"/>
+      <pc:docMkLst>
+        <pc:docMk/>
+      </pc:docMkLst>
+      <pc:sldChg chg="modSp">
+        <pc:chgData name="Office2072" userId="52a5ddc4-b969-43fa-a50f-5e0a92d364aa" providerId="ADAL" clId="{5B2918AB-ACD9-4AC8-8541-F71793DE81EB}" dt="2019-09-15T12:35:28.503" v="69" actId="27636"/>
+        <pc:sldMkLst>
+          <pc:docMk/>
+          <pc:sldMk cId="2061013508" sldId="257"/>
+        </pc:sldMkLst>
+        <pc:spChg chg="mod">
+          <ac:chgData name="Office2072" userId="52a5ddc4-b969-43fa-a50f-5e0a92d364aa" providerId="ADAL" clId="{5B2918AB-ACD9-4AC8-8541-F71793DE81EB}" dt="2019-09-15T12:35:28.503" v="69" actId="27636"/>
+          <ac:spMkLst>
+            <pc:docMk/>
+            <pc:sldMk cId="2061013508" sldId="257"/>
+            <ac:spMk id="3" creationId="{74DD0ECB-3322-428C-8D7C-1FB23DD3AA4D}"/>
+          </ac:spMkLst>
+        </pc:spChg>
+      </pc:sldChg>
+      <pc:sldChg chg="addSp delSp modSp add">
+        <pc:chgData name="Office2072" userId="52a5ddc4-b969-43fa-a50f-5e0a92d364aa" providerId="ADAL" clId="{5B2918AB-ACD9-4AC8-8541-F71793DE81EB}" dt="2019-09-15T12:34:44.414" v="41" actId="14100"/>
+        <pc:sldMkLst>
+          <pc:docMk/>
+          <pc:sldMk cId="2023127618" sldId="264"/>
+        </pc:sldMkLst>
+        <pc:spChg chg="mod">
+          <ac:chgData name="Office2072" userId="52a5ddc4-b969-43fa-a50f-5e0a92d364aa" providerId="ADAL" clId="{5B2918AB-ACD9-4AC8-8541-F71793DE81EB}" dt="2019-09-15T12:34:39.250" v="40" actId="20577"/>
+          <ac:spMkLst>
+            <pc:docMk/>
+            <pc:sldMk cId="2023127618" sldId="264"/>
+            <ac:spMk id="2" creationId="{61333A06-9A26-443C-A929-A58F9876ADE7}"/>
+          </ac:spMkLst>
+        </pc:spChg>
+        <pc:spChg chg="del">
+          <ac:chgData name="Office2072" userId="52a5ddc4-b969-43fa-a50f-5e0a92d364aa" providerId="ADAL" clId="{5B2918AB-ACD9-4AC8-8541-F71793DE81EB}" dt="2019-09-15T12:33:47.760" v="1"/>
+          <ac:spMkLst>
+            <pc:docMk/>
+            <pc:sldMk cId="2023127618" sldId="264"/>
+            <ac:spMk id="3" creationId="{DBE8D726-6CD2-498D-9C8D-6D35CC9DE565}"/>
+          </ac:spMkLst>
+        </pc:spChg>
+        <pc:picChg chg="add mod">
+          <ac:chgData name="Office2072" userId="52a5ddc4-b969-43fa-a50f-5e0a92d364aa" providerId="ADAL" clId="{5B2918AB-ACD9-4AC8-8541-F71793DE81EB}" dt="2019-09-15T12:34:44.414" v="41" actId="14100"/>
+          <ac:picMkLst>
+            <pc:docMk/>
+            <pc:sldMk cId="2023127618" sldId="264"/>
+            <ac:picMk id="1026" creationId="{1745679B-FC18-4F2A-85C6-89FE6A41CD5E}"/>
+          </ac:picMkLst>
+        </pc:picChg>
+      </pc:sldChg>
+    </pc:docChg>
+  </pc:docChgLst>
   <pc:docChgLst>
     <pc:chgData name="Office2072" userId="52a5ddc4-b969-43fa-a50f-5e0a92d364aa" providerId="ADAL" clId="{43C3D700-A46E-4C7D-896D-F303ADE50D45}"/>
     <pc:docChg chg="custSel modSld">
@@ -255,7 +317,7 @@
           <a:noFill/>
           <a:extLst>
             <a:ext uri="{909E8E84-426E-40dd-AFC4-6F175D3DCCD1}">
-              <a14:hiddenFill xmlns:a14="http://schemas.microsoft.com/office/drawing/2010/main" xmlns="">
+              <a14:hiddenFill xmlns="" xmlns:a14="http://schemas.microsoft.com/office/drawing/2010/main">
                 <a:solidFill>
                   <a:srgbClr val="FFFFFF"/>
                 </a:solidFill>
@@ -315,7 +377,7 @@
             </a:ln>
             <a:extLst>
               <a:ext uri="{91240B29-F687-4f45-9708-019B960494DF}">
-                <a14:hiddenLine xmlns:a14="http://schemas.microsoft.com/office/drawing/2010/main" xmlns="" w="9525">
+                <a14:hiddenLine xmlns="" xmlns:a14="http://schemas.microsoft.com/office/drawing/2010/main" w="9525">
                   <a:solidFill>
                     <a:srgbClr val="000000"/>
                   </a:solidFill>
@@ -405,7 +467,7 @@
             </a:ln>
             <a:extLst>
               <a:ext uri="{91240B29-F687-4f45-9708-019B960494DF}">
-                <a14:hiddenLine xmlns:a14="http://schemas.microsoft.com/office/drawing/2010/main" xmlns="" w="9525">
+                <a14:hiddenLine xmlns="" xmlns:a14="http://schemas.microsoft.com/office/drawing/2010/main" w="9525">
                   <a:solidFill>
                     <a:srgbClr val="000000"/>
                   </a:solidFill>
@@ -495,7 +557,7 @@
             </a:ln>
             <a:extLst>
               <a:ext uri="{91240B29-F687-4f45-9708-019B960494DF}">
-                <a14:hiddenLine xmlns:a14="http://schemas.microsoft.com/office/drawing/2010/main" xmlns="" w="9525">
+                <a14:hiddenLine xmlns="" xmlns:a14="http://schemas.microsoft.com/office/drawing/2010/main" w="9525">
                   <a:solidFill>
                     <a:srgbClr val="000000"/>
                   </a:solidFill>
@@ -529,7 +591,7 @@
             </a:ln>
             <a:extLst>
               <a:ext uri="{91240B29-F687-4f45-9708-019B960494DF}">
-                <a14:hiddenLine xmlns:a14="http://schemas.microsoft.com/office/drawing/2010/main" xmlns="" w="9525">
+                <a14:hiddenLine xmlns="" xmlns:a14="http://schemas.microsoft.com/office/drawing/2010/main" w="9525">
                   <a:solidFill>
                     <a:srgbClr val="000000"/>
                   </a:solidFill>
@@ -619,7 +681,7 @@
             </a:ln>
             <a:extLst>
               <a:ext uri="{91240B29-F687-4f45-9708-019B960494DF}">
-                <a14:hiddenLine xmlns:a14="http://schemas.microsoft.com/office/drawing/2010/main" xmlns="" w="9525">
+                <a14:hiddenLine xmlns="" xmlns:a14="http://schemas.microsoft.com/office/drawing/2010/main" w="9525">
                   <a:solidFill>
                     <a:srgbClr val="000000"/>
                   </a:solidFill>
@@ -681,7 +743,7 @@
             </a:ln>
             <a:extLst>
               <a:ext uri="{91240B29-F687-4f45-9708-019B960494DF}">
-                <a14:hiddenLine xmlns:a14="http://schemas.microsoft.com/office/drawing/2010/main" xmlns="" w="9525">
+                <a14:hiddenLine xmlns="" xmlns:a14="http://schemas.microsoft.com/office/drawing/2010/main" w="9525">
                   <a:solidFill>
                     <a:srgbClr val="000000"/>
                   </a:solidFill>
@@ -743,7 +805,7 @@
             </a:ln>
             <a:extLst>
               <a:ext uri="{91240B29-F687-4f45-9708-019B960494DF}">
-                <a14:hiddenLine xmlns:a14="http://schemas.microsoft.com/office/drawing/2010/main" xmlns="" w="9525">
+                <a14:hiddenLine xmlns="" xmlns:a14="http://schemas.microsoft.com/office/drawing/2010/main" w="9525">
                   <a:solidFill>
                     <a:srgbClr val="000000"/>
                   </a:solidFill>
@@ -833,7 +895,7 @@
             </a:ln>
             <a:extLst>
               <a:ext uri="{91240B29-F687-4f45-9708-019B960494DF}">
-                <a14:hiddenLine xmlns:a14="http://schemas.microsoft.com/office/drawing/2010/main" xmlns="" w="9525">
+                <a14:hiddenLine xmlns="" xmlns:a14="http://schemas.microsoft.com/office/drawing/2010/main" w="9525">
                   <a:solidFill>
                     <a:srgbClr val="000000"/>
                   </a:solidFill>
@@ -895,7 +957,7 @@
             </a:ln>
             <a:extLst>
               <a:ext uri="{91240B29-F687-4f45-9708-019B960494DF}">
-                <a14:hiddenLine xmlns:a14="http://schemas.microsoft.com/office/drawing/2010/main" xmlns="" w="9525">
+                <a14:hiddenLine xmlns="" xmlns:a14="http://schemas.microsoft.com/office/drawing/2010/main" w="9525">
                   <a:solidFill>
                     <a:srgbClr val="000000"/>
                   </a:solidFill>
@@ -957,7 +1019,7 @@
             </a:ln>
             <a:extLst>
               <a:ext uri="{91240B29-F687-4f45-9708-019B960494DF}">
-                <a14:hiddenLine xmlns:a14="http://schemas.microsoft.com/office/drawing/2010/main" xmlns="" w="9525">
+                <a14:hiddenLine xmlns="" xmlns:a14="http://schemas.microsoft.com/office/drawing/2010/main" w="9525">
                   <a:solidFill>
                     <a:srgbClr val="000000"/>
                   </a:solidFill>
@@ -1047,7 +1109,7 @@
             </a:ln>
             <a:extLst>
               <a:ext uri="{91240B29-F687-4f45-9708-019B960494DF}">
-                <a14:hiddenLine xmlns:a14="http://schemas.microsoft.com/office/drawing/2010/main" xmlns="" w="9525">
+                <a14:hiddenLine xmlns="" xmlns:a14="http://schemas.microsoft.com/office/drawing/2010/main" w="9525">
                   <a:solidFill>
                     <a:srgbClr val="000000"/>
                   </a:solidFill>
@@ -1137,7 +1199,7 @@
             </a:ln>
             <a:extLst>
               <a:ext uri="{91240B29-F687-4f45-9708-019B960494DF}">
-                <a14:hiddenLine xmlns:a14="http://schemas.microsoft.com/office/drawing/2010/main" xmlns="" w="9525">
+                <a14:hiddenLine xmlns="" xmlns:a14="http://schemas.microsoft.com/office/drawing/2010/main" w="9525">
                   <a:solidFill>
                     <a:srgbClr val="000000"/>
                   </a:solidFill>
@@ -1199,7 +1261,7 @@
             </a:ln>
             <a:extLst>
               <a:ext uri="{91240B29-F687-4f45-9708-019B960494DF}">
-                <a14:hiddenLine xmlns:a14="http://schemas.microsoft.com/office/drawing/2010/main" xmlns="" w="9525">
+                <a14:hiddenLine xmlns="" xmlns:a14="http://schemas.microsoft.com/office/drawing/2010/main" w="9525">
                   <a:solidFill>
                     <a:srgbClr val="000000"/>
                   </a:solidFill>
@@ -1309,7 +1371,7 @@
             </a:ln>
             <a:extLst>
               <a:ext uri="{91240B29-F687-4f45-9708-019B960494DF}">
-                <a14:hiddenLine xmlns:a14="http://schemas.microsoft.com/office/drawing/2010/main" xmlns="" w="9525">
+                <a14:hiddenLine xmlns="" xmlns:a14="http://schemas.microsoft.com/office/drawing/2010/main" w="9525">
                   <a:solidFill>
                     <a:srgbClr val="000000"/>
                   </a:solidFill>
@@ -1371,7 +1433,7 @@
             </a:ln>
             <a:extLst>
               <a:ext uri="{91240B29-F687-4f45-9708-019B960494DF}">
-                <a14:hiddenLine xmlns:a14="http://schemas.microsoft.com/office/drawing/2010/main" xmlns="" w="9525">
+                <a14:hiddenLine xmlns="" xmlns:a14="http://schemas.microsoft.com/office/drawing/2010/main" w="9525">
                   <a:solidFill>
                     <a:srgbClr val="000000"/>
                   </a:solidFill>
@@ -1461,7 +1523,7 @@
             </a:ln>
             <a:extLst>
               <a:ext uri="{91240B29-F687-4f45-9708-019B960494DF}">
-                <a14:hiddenLine xmlns:a14="http://schemas.microsoft.com/office/drawing/2010/main" xmlns="" w="9525">
+                <a14:hiddenLine xmlns="" xmlns:a14="http://schemas.microsoft.com/office/drawing/2010/main" w="9525">
                   <a:solidFill>
                     <a:srgbClr val="000000"/>
                   </a:solidFill>
@@ -1551,7 +1613,7 @@
             </a:ln>
             <a:extLst>
               <a:ext uri="{91240B29-F687-4f45-9708-019B960494DF}">
-                <a14:hiddenLine xmlns:a14="http://schemas.microsoft.com/office/drawing/2010/main" xmlns="" w="9525">
+                <a14:hiddenLine xmlns="" xmlns:a14="http://schemas.microsoft.com/office/drawing/2010/main" w="9525">
                   <a:solidFill>
                     <a:srgbClr val="000000"/>
                   </a:solidFill>
@@ -1613,7 +1675,7 @@
             </a:ln>
             <a:extLst>
               <a:ext uri="{91240B29-F687-4f45-9708-019B960494DF}">
-                <a14:hiddenLine xmlns:a14="http://schemas.microsoft.com/office/drawing/2010/main" xmlns="" w="9525">
+                <a14:hiddenLine xmlns="" xmlns:a14="http://schemas.microsoft.com/office/drawing/2010/main" w="9525">
                   <a:solidFill>
                     <a:srgbClr val="000000"/>
                   </a:solidFill>
@@ -1703,7 +1765,7 @@
             </a:ln>
             <a:extLst>
               <a:ext uri="{91240B29-F687-4f45-9708-019B960494DF}">
-                <a14:hiddenLine xmlns:a14="http://schemas.microsoft.com/office/drawing/2010/main" xmlns="" w="9525">
+                <a14:hiddenLine xmlns="" xmlns:a14="http://schemas.microsoft.com/office/drawing/2010/main" w="9525">
                   <a:solidFill>
                     <a:srgbClr val="000000"/>
                   </a:solidFill>
@@ -1793,7 +1855,7 @@
             </a:ln>
             <a:extLst>
               <a:ext uri="{91240B29-F687-4f45-9708-019B960494DF}">
-                <a14:hiddenLine xmlns:a14="http://schemas.microsoft.com/office/drawing/2010/main" xmlns="" w="9525">
+                <a14:hiddenLine xmlns="" xmlns:a14="http://schemas.microsoft.com/office/drawing/2010/main" w="9525">
                   <a:solidFill>
                     <a:srgbClr val="000000"/>
                   </a:solidFill>
@@ -1849,7 +1911,7 @@
             </a:ln>
             <a:extLst>
               <a:ext uri="{91240B29-F687-4f45-9708-019B960494DF}">
-                <a14:hiddenLine xmlns:a14="http://schemas.microsoft.com/office/drawing/2010/main" xmlns="" w="9525">
+                <a14:hiddenLine xmlns="" xmlns:a14="http://schemas.microsoft.com/office/drawing/2010/main" w="9525">
                   <a:solidFill>
                     <a:srgbClr val="000000"/>
                   </a:solidFill>
@@ -1939,7 +2001,7 @@
             </a:ln>
             <a:extLst>
               <a:ext uri="{91240B29-F687-4f45-9708-019B960494DF}">
-                <a14:hiddenLine xmlns:a14="http://schemas.microsoft.com/office/drawing/2010/main" xmlns="" w="9525">
+                <a14:hiddenLine xmlns="" xmlns:a14="http://schemas.microsoft.com/office/drawing/2010/main" w="9525">
                   <a:solidFill>
                     <a:srgbClr val="000000"/>
                   </a:solidFill>
@@ -1995,7 +2057,7 @@
             </a:ln>
             <a:extLst>
               <a:ext uri="{91240B29-F687-4f45-9708-019B960494DF}">
-                <a14:hiddenLine xmlns:a14="http://schemas.microsoft.com/office/drawing/2010/main" xmlns="" w="9525">
+                <a14:hiddenLine xmlns="" xmlns:a14="http://schemas.microsoft.com/office/drawing/2010/main" w="9525">
                   <a:solidFill>
                     <a:srgbClr val="000000"/>
                   </a:solidFill>
@@ -2085,7 +2147,7 @@
             </a:ln>
             <a:extLst>
               <a:ext uri="{91240B29-F687-4f45-9708-019B960494DF}">
-                <a14:hiddenLine xmlns:a14="http://schemas.microsoft.com/office/drawing/2010/main" xmlns="" w="9525">
+                <a14:hiddenLine xmlns="" xmlns:a14="http://schemas.microsoft.com/office/drawing/2010/main" w="9525">
                   <a:solidFill>
                     <a:srgbClr val="000000"/>
                   </a:solidFill>
@@ -2153,7 +2215,7 @@
             </a:ln>
             <a:extLst>
               <a:ext uri="{91240B29-F687-4f45-9708-019B960494DF}">
-                <a14:hiddenLine xmlns:a14="http://schemas.microsoft.com/office/drawing/2010/main" xmlns="" w="9525">
+                <a14:hiddenLine xmlns="" xmlns:a14="http://schemas.microsoft.com/office/drawing/2010/main" w="9525">
                   <a:solidFill>
                     <a:srgbClr val="000000"/>
                   </a:solidFill>
@@ -2243,7 +2305,7 @@
             </a:ln>
             <a:extLst>
               <a:ext uri="{91240B29-F687-4f45-9708-019B960494DF}">
-                <a14:hiddenLine xmlns:a14="http://schemas.microsoft.com/office/drawing/2010/main" xmlns="" w="9525">
+                <a14:hiddenLine xmlns="" xmlns:a14="http://schemas.microsoft.com/office/drawing/2010/main" w="9525">
                   <a:solidFill>
                     <a:srgbClr val="000000"/>
                   </a:solidFill>
@@ -2311,7 +2373,7 @@
             </a:ln>
             <a:extLst>
               <a:ext uri="{91240B29-F687-4f45-9708-019B960494DF}">
-                <a14:hiddenLine xmlns:a14="http://schemas.microsoft.com/office/drawing/2010/main" xmlns="" w="9525">
+                <a14:hiddenLine xmlns="" xmlns:a14="http://schemas.microsoft.com/office/drawing/2010/main" w="9525">
                   <a:solidFill>
                     <a:srgbClr val="000000"/>
                   </a:solidFill>
@@ -2401,7 +2463,7 @@
             </a:ln>
             <a:extLst>
               <a:ext uri="{91240B29-F687-4f45-9708-019B960494DF}">
-                <a14:hiddenLine xmlns:a14="http://schemas.microsoft.com/office/drawing/2010/main" xmlns="" w="9525">
+                <a14:hiddenLine xmlns="" xmlns:a14="http://schemas.microsoft.com/office/drawing/2010/main" w="9525">
                   <a:solidFill>
                     <a:srgbClr val="000000"/>
                   </a:solidFill>
@@ -2435,7 +2497,7 @@
             </a:ln>
             <a:extLst>
               <a:ext uri="{91240B29-F687-4f45-9708-019B960494DF}">
-                <a14:hiddenLine xmlns:a14="http://schemas.microsoft.com/office/drawing/2010/main" xmlns="" w="9525">
+                <a14:hiddenLine xmlns="" xmlns:a14="http://schemas.microsoft.com/office/drawing/2010/main" w="9525">
                   <a:solidFill>
                     <a:srgbClr val="000000"/>
                   </a:solidFill>
@@ -2525,7 +2587,7 @@
             </a:ln>
             <a:extLst>
               <a:ext uri="{91240B29-F687-4f45-9708-019B960494DF}">
-                <a14:hiddenLine xmlns:a14="http://schemas.microsoft.com/office/drawing/2010/main" xmlns="" w="9525">
+                <a14:hiddenLine xmlns="" xmlns:a14="http://schemas.microsoft.com/office/drawing/2010/main" w="9525">
                   <a:solidFill>
                     <a:srgbClr val="000000"/>
                   </a:solidFill>
@@ -2587,7 +2649,7 @@
             </a:ln>
             <a:extLst>
               <a:ext uri="{91240B29-F687-4f45-9708-019B960494DF}">
-                <a14:hiddenLine xmlns:a14="http://schemas.microsoft.com/office/drawing/2010/main" xmlns="" w="9525">
+                <a14:hiddenLine xmlns="" xmlns:a14="http://schemas.microsoft.com/office/drawing/2010/main" w="9525">
                   <a:solidFill>
                     <a:srgbClr val="000000"/>
                   </a:solidFill>
@@ -2649,7 +2711,7 @@
             </a:ln>
             <a:extLst>
               <a:ext uri="{91240B29-F687-4f45-9708-019B960494DF}">
-                <a14:hiddenLine xmlns:a14="http://schemas.microsoft.com/office/drawing/2010/main" xmlns="" w="9525">
+                <a14:hiddenLine xmlns="" xmlns:a14="http://schemas.microsoft.com/office/drawing/2010/main" w="9525">
                   <a:solidFill>
                     <a:srgbClr val="000000"/>
                   </a:solidFill>
@@ -2739,7 +2801,7 @@
             </a:ln>
             <a:extLst>
               <a:ext uri="{91240B29-F687-4f45-9708-019B960494DF}">
-                <a14:hiddenLine xmlns:a14="http://schemas.microsoft.com/office/drawing/2010/main" xmlns="" w="9525">
+                <a14:hiddenLine xmlns="" xmlns:a14="http://schemas.microsoft.com/office/drawing/2010/main" w="9525">
                   <a:solidFill>
                     <a:srgbClr val="000000"/>
                   </a:solidFill>
@@ -2807,7 +2869,7 @@
             </a:ln>
             <a:extLst>
               <a:ext uri="{91240B29-F687-4f45-9708-019B960494DF}">
-                <a14:hiddenLine xmlns:a14="http://schemas.microsoft.com/office/drawing/2010/main" xmlns="" w="9525">
+                <a14:hiddenLine xmlns="" xmlns:a14="http://schemas.microsoft.com/office/drawing/2010/main" w="9525">
                   <a:solidFill>
                     <a:srgbClr val="000000"/>
                   </a:solidFill>
@@ -2869,7 +2931,7 @@
             </a:ln>
             <a:extLst>
               <a:ext uri="{91240B29-F687-4f45-9708-019B960494DF}">
-                <a14:hiddenLine xmlns:a14="http://schemas.microsoft.com/office/drawing/2010/main" xmlns="" w="9525">
+                <a14:hiddenLine xmlns="" xmlns:a14="http://schemas.microsoft.com/office/drawing/2010/main" w="9525">
                   <a:solidFill>
                     <a:srgbClr val="000000"/>
                   </a:solidFill>
@@ -2959,7 +3021,7 @@
             </a:ln>
             <a:extLst>
               <a:ext uri="{91240B29-F687-4f45-9708-019B960494DF}">
-                <a14:hiddenLine xmlns:a14="http://schemas.microsoft.com/office/drawing/2010/main" xmlns="" w="9525">
+                <a14:hiddenLine xmlns="" xmlns:a14="http://schemas.microsoft.com/office/drawing/2010/main" w="9525">
                   <a:solidFill>
                     <a:srgbClr val="000000"/>
                   </a:solidFill>
@@ -3021,7 +3083,7 @@
             </a:ln>
             <a:extLst>
               <a:ext uri="{91240B29-F687-4f45-9708-019B960494DF}">
-                <a14:hiddenLine xmlns:a14="http://schemas.microsoft.com/office/drawing/2010/main" xmlns="" w="9525">
+                <a14:hiddenLine xmlns="" xmlns:a14="http://schemas.microsoft.com/office/drawing/2010/main" w="9525">
                   <a:solidFill>
                     <a:srgbClr val="000000"/>
                   </a:solidFill>
@@ -3111,7 +3173,7 @@
             </a:ln>
             <a:extLst>
               <a:ext uri="{91240B29-F687-4f45-9708-019B960494DF}">
-                <a14:hiddenLine xmlns:a14="http://schemas.microsoft.com/office/drawing/2010/main" xmlns="" w="9525">
+                <a14:hiddenLine xmlns="" xmlns:a14="http://schemas.microsoft.com/office/drawing/2010/main" w="9525">
                   <a:solidFill>
                     <a:srgbClr val="000000"/>
                   </a:solidFill>
@@ -3173,7 +3235,7 @@
             </a:ln>
             <a:extLst>
               <a:ext uri="{91240B29-F687-4f45-9708-019B960494DF}">
-                <a14:hiddenLine xmlns:a14="http://schemas.microsoft.com/office/drawing/2010/main" xmlns="" w="9525">
+                <a14:hiddenLine xmlns="" xmlns:a14="http://schemas.microsoft.com/office/drawing/2010/main" w="9525">
                   <a:solidFill>
                     <a:srgbClr val="000000"/>
                   </a:solidFill>
@@ -3263,7 +3325,7 @@
             </a:ln>
             <a:extLst>
               <a:ext uri="{91240B29-F687-4f45-9708-019B960494DF}">
-                <a14:hiddenLine xmlns:a14="http://schemas.microsoft.com/office/drawing/2010/main" xmlns="" w="9525">
+                <a14:hiddenLine xmlns="" xmlns:a14="http://schemas.microsoft.com/office/drawing/2010/main" w="9525">
                   <a:solidFill>
                     <a:srgbClr val="000000"/>
                   </a:solidFill>
@@ -3297,7 +3359,7 @@
             </a:ln>
             <a:extLst>
               <a:ext uri="{91240B29-F687-4f45-9708-019B960494DF}">
-                <a14:hiddenLine xmlns:a14="http://schemas.microsoft.com/office/drawing/2010/main" xmlns="" w="9525">
+                <a14:hiddenLine xmlns="" xmlns:a14="http://schemas.microsoft.com/office/drawing/2010/main" w="9525">
                   <a:solidFill>
                     <a:srgbClr val="000000"/>
                   </a:solidFill>
@@ -3362,7 +3424,7 @@
             </a:ln>
             <a:extLst>
               <a:ext uri="{91240B29-F687-4f45-9708-019B960494DF}">
-                <a14:hiddenLine xmlns:a14="http://schemas.microsoft.com/office/drawing/2010/main" xmlns="" w="9525">
+                <a14:hiddenLine xmlns="" xmlns:a14="http://schemas.microsoft.com/office/drawing/2010/main" w="9525">
                   <a:solidFill>
                     <a:srgbClr val="000000"/>
                   </a:solidFill>
@@ -3452,7 +3514,7 @@
             </a:ln>
             <a:extLst>
               <a:ext uri="{91240B29-F687-4f45-9708-019B960494DF}">
-                <a14:hiddenLine xmlns:a14="http://schemas.microsoft.com/office/drawing/2010/main" xmlns="" w="9525">
+                <a14:hiddenLine xmlns="" xmlns:a14="http://schemas.microsoft.com/office/drawing/2010/main" w="9525">
                   <a:solidFill>
                     <a:srgbClr val="000000"/>
                   </a:solidFill>
@@ -3514,7 +3576,7 @@
             </a:ln>
             <a:extLst>
               <a:ext uri="{91240B29-F687-4f45-9708-019B960494DF}">
-                <a14:hiddenLine xmlns:a14="http://schemas.microsoft.com/office/drawing/2010/main" xmlns="" w="9525">
+                <a14:hiddenLine xmlns="" xmlns:a14="http://schemas.microsoft.com/office/drawing/2010/main" w="9525">
                   <a:solidFill>
                     <a:srgbClr val="000000"/>
                   </a:solidFill>
@@ -3604,7 +3666,7 @@
             </a:ln>
             <a:extLst>
               <a:ext uri="{91240B29-F687-4f45-9708-019B960494DF}">
-                <a14:hiddenLine xmlns:a14="http://schemas.microsoft.com/office/drawing/2010/main" xmlns="" w="9525">
+                <a14:hiddenLine xmlns="" xmlns:a14="http://schemas.microsoft.com/office/drawing/2010/main" w="9525">
                   <a:solidFill>
                     <a:srgbClr val="000000"/>
                   </a:solidFill>
@@ -3694,7 +3756,7 @@
             </a:ln>
             <a:extLst>
               <a:ext uri="{91240B29-F687-4f45-9708-019B960494DF}">
-                <a14:hiddenLine xmlns:a14="http://schemas.microsoft.com/office/drawing/2010/main" xmlns="" w="9525">
+                <a14:hiddenLine xmlns="" xmlns:a14="http://schemas.microsoft.com/office/drawing/2010/main" w="9525">
                   <a:solidFill>
                     <a:srgbClr val="000000"/>
                   </a:solidFill>
@@ -3759,7 +3821,7 @@
             </a:ln>
             <a:extLst>
               <a:ext uri="{91240B29-F687-4f45-9708-019B960494DF}">
-                <a14:hiddenLine xmlns:a14="http://schemas.microsoft.com/office/drawing/2010/main" xmlns="" w="9525">
+                <a14:hiddenLine xmlns="" xmlns:a14="http://schemas.microsoft.com/office/drawing/2010/main" w="9525">
                   <a:solidFill>
                     <a:srgbClr val="000000"/>
                   </a:solidFill>
@@ -3821,7 +3883,7 @@
             </a:ln>
             <a:extLst>
               <a:ext uri="{91240B29-F687-4f45-9708-019B960494DF}">
-                <a14:hiddenLine xmlns:a14="http://schemas.microsoft.com/office/drawing/2010/main" xmlns="" w="9525">
+                <a14:hiddenLine xmlns="" xmlns:a14="http://schemas.microsoft.com/office/drawing/2010/main" w="9525">
                   <a:solidFill>
                     <a:srgbClr val="000000"/>
                   </a:solidFill>
@@ -3911,7 +3973,7 @@
             </a:ln>
             <a:extLst>
               <a:ext uri="{91240B29-F687-4f45-9708-019B960494DF}">
-                <a14:hiddenLine xmlns:a14="http://schemas.microsoft.com/office/drawing/2010/main" xmlns="" w="9525">
+                <a14:hiddenLine xmlns="" xmlns:a14="http://schemas.microsoft.com/office/drawing/2010/main" w="9525">
                   <a:solidFill>
                     <a:srgbClr val="000000"/>
                   </a:solidFill>
@@ -4001,7 +4063,7 @@
             </a:ln>
             <a:extLst>
               <a:ext uri="{91240B29-F687-4f45-9708-019B960494DF}">
-                <a14:hiddenLine xmlns:a14="http://schemas.microsoft.com/office/drawing/2010/main" xmlns="" w="9525">
+                <a14:hiddenLine xmlns="" xmlns:a14="http://schemas.microsoft.com/office/drawing/2010/main" w="9525">
                   <a:solidFill>
                     <a:srgbClr val="000000"/>
                   </a:solidFill>
@@ -4063,7 +4125,7 @@
             </a:ln>
             <a:extLst>
               <a:ext uri="{91240B29-F687-4f45-9708-019B960494DF}">
-                <a14:hiddenLine xmlns:a14="http://schemas.microsoft.com/office/drawing/2010/main" xmlns="" w="9525">
+                <a14:hiddenLine xmlns="" xmlns:a14="http://schemas.microsoft.com/office/drawing/2010/main" w="9525">
                   <a:solidFill>
                     <a:srgbClr val="000000"/>
                   </a:solidFill>
@@ -4183,7 +4245,7 @@
             </a:ln>
             <a:extLst>
               <a:ext uri="{91240B29-F687-4f45-9708-019B960494DF}">
-                <a14:hiddenLine xmlns:a14="http://schemas.microsoft.com/office/drawing/2010/main" xmlns="" w="9525">
+                <a14:hiddenLine xmlns="" xmlns:a14="http://schemas.microsoft.com/office/drawing/2010/main" w="9525">
                   <a:solidFill>
                     <a:srgbClr val="000000"/>
                   </a:solidFill>
@@ -4251,7 +4313,7 @@
             </a:ln>
             <a:extLst>
               <a:ext uri="{91240B29-F687-4f45-9708-019B960494DF}">
-                <a14:hiddenLine xmlns:a14="http://schemas.microsoft.com/office/drawing/2010/main" xmlns="" w="9525">
+                <a14:hiddenLine xmlns="" xmlns:a14="http://schemas.microsoft.com/office/drawing/2010/main" w="9525">
                   <a:solidFill>
                     <a:srgbClr val="000000"/>
                   </a:solidFill>
@@ -4341,7 +4403,7 @@
             </a:ln>
             <a:extLst>
               <a:ext uri="{91240B29-F687-4f45-9708-019B960494DF}">
-                <a14:hiddenLine xmlns:a14="http://schemas.microsoft.com/office/drawing/2010/main" xmlns="" w="9525">
+                <a14:hiddenLine xmlns="" xmlns:a14="http://schemas.microsoft.com/office/drawing/2010/main" w="9525">
                   <a:solidFill>
                     <a:srgbClr val="000000"/>
                   </a:solidFill>
@@ -9063,7 +9125,7 @@
           <a:noFill/>
           <a:extLst>
             <a:ext uri="{909E8E84-426E-40dd-AFC4-6F175D3DCCD1}">
-              <a14:hiddenFill xmlns:a14="http://schemas.microsoft.com/office/drawing/2010/main" xmlns="">
+              <a14:hiddenFill xmlns="" xmlns:a14="http://schemas.microsoft.com/office/drawing/2010/main">
                 <a:solidFill>
                   <a:srgbClr val="FFFFFF"/>
                 </a:solidFill>
@@ -9137,7 +9199,7 @@
               </a:ln>
               <a:extLst>
                 <a:ext uri="{91240B29-F687-4f45-9708-019B960494DF}">
-                  <a14:hiddenLine xmlns:a14="http://schemas.microsoft.com/office/drawing/2010/main" xmlns="" w="9525">
+                  <a14:hiddenLine xmlns="" xmlns:a14="http://schemas.microsoft.com/office/drawing/2010/main" w="9525">
                     <a:solidFill>
                       <a:srgbClr val="000000"/>
                     </a:solidFill>
@@ -9227,7 +9289,7 @@
               </a:ln>
               <a:extLst>
                 <a:ext uri="{91240B29-F687-4f45-9708-019B960494DF}">
-                  <a14:hiddenLine xmlns:a14="http://schemas.microsoft.com/office/drawing/2010/main" xmlns="" w="9525">
+                  <a14:hiddenLine xmlns="" xmlns:a14="http://schemas.microsoft.com/office/drawing/2010/main" w="9525">
                     <a:solidFill>
                       <a:srgbClr val="000000"/>
                     </a:solidFill>
@@ -9317,7 +9379,7 @@
               </a:ln>
               <a:extLst>
                 <a:ext uri="{91240B29-F687-4f45-9708-019B960494DF}">
-                  <a14:hiddenLine xmlns:a14="http://schemas.microsoft.com/office/drawing/2010/main" xmlns="" w="9525">
+                  <a14:hiddenLine xmlns="" xmlns:a14="http://schemas.microsoft.com/office/drawing/2010/main" w="9525">
                     <a:solidFill>
                       <a:srgbClr val="000000"/>
                     </a:solidFill>
@@ -9379,7 +9441,7 @@
               </a:ln>
               <a:extLst>
                 <a:ext uri="{91240B29-F687-4f45-9708-019B960494DF}">
-                  <a14:hiddenLine xmlns:a14="http://schemas.microsoft.com/office/drawing/2010/main" xmlns="" w="9525">
+                  <a14:hiddenLine xmlns="" xmlns:a14="http://schemas.microsoft.com/office/drawing/2010/main" w="9525">
                     <a:solidFill>
                       <a:srgbClr val="000000"/>
                     </a:solidFill>
@@ -9469,7 +9531,7 @@
               </a:ln>
               <a:extLst>
                 <a:ext uri="{91240B29-F687-4f45-9708-019B960494DF}">
-                  <a14:hiddenLine xmlns:a14="http://schemas.microsoft.com/office/drawing/2010/main" xmlns="" w="9525">
+                  <a14:hiddenLine xmlns="" xmlns:a14="http://schemas.microsoft.com/office/drawing/2010/main" w="9525">
                     <a:solidFill>
                       <a:srgbClr val="000000"/>
                     </a:solidFill>
@@ -9531,7 +9593,7 @@
               </a:ln>
               <a:extLst>
                 <a:ext uri="{91240B29-F687-4f45-9708-019B960494DF}">
-                  <a14:hiddenLine xmlns:a14="http://schemas.microsoft.com/office/drawing/2010/main" xmlns="" w="9525">
+                  <a14:hiddenLine xmlns="" xmlns:a14="http://schemas.microsoft.com/office/drawing/2010/main" w="9525">
                     <a:solidFill>
                       <a:srgbClr val="000000"/>
                     </a:solidFill>
@@ -9593,7 +9655,7 @@
               </a:ln>
               <a:extLst>
                 <a:ext uri="{91240B29-F687-4f45-9708-019B960494DF}">
-                  <a14:hiddenLine xmlns:a14="http://schemas.microsoft.com/office/drawing/2010/main" xmlns="" w="9525">
+                  <a14:hiddenLine xmlns="" xmlns:a14="http://schemas.microsoft.com/office/drawing/2010/main" w="9525">
                     <a:solidFill>
                       <a:srgbClr val="000000"/>
                     </a:solidFill>
@@ -9683,7 +9745,7 @@
               </a:ln>
               <a:extLst>
                 <a:ext uri="{91240B29-F687-4f45-9708-019B960494DF}">
-                  <a14:hiddenLine xmlns:a14="http://schemas.microsoft.com/office/drawing/2010/main" xmlns="" w="9525">
+                  <a14:hiddenLine xmlns="" xmlns:a14="http://schemas.microsoft.com/office/drawing/2010/main" w="9525">
                     <a:solidFill>
                       <a:srgbClr val="000000"/>
                     </a:solidFill>
@@ -9773,7 +9835,7 @@
               </a:ln>
               <a:extLst>
                 <a:ext uri="{91240B29-F687-4f45-9708-019B960494DF}">
-                  <a14:hiddenLine xmlns:a14="http://schemas.microsoft.com/office/drawing/2010/main" xmlns="" w="9525">
+                  <a14:hiddenLine xmlns="" xmlns:a14="http://schemas.microsoft.com/office/drawing/2010/main" w="9525">
                     <a:solidFill>
                       <a:srgbClr val="000000"/>
                     </a:solidFill>
@@ -9835,7 +9897,7 @@
               </a:ln>
               <a:extLst>
                 <a:ext uri="{91240B29-F687-4f45-9708-019B960494DF}">
-                  <a14:hiddenLine xmlns:a14="http://schemas.microsoft.com/office/drawing/2010/main" xmlns="" w="9525">
+                  <a14:hiddenLine xmlns="" xmlns:a14="http://schemas.microsoft.com/office/drawing/2010/main" w="9525">
                     <a:solidFill>
                       <a:srgbClr val="000000"/>
                     </a:solidFill>
@@ -9945,7 +10007,7 @@
               </a:ln>
               <a:extLst>
                 <a:ext uri="{91240B29-F687-4f45-9708-019B960494DF}">
-                  <a14:hiddenLine xmlns:a14="http://schemas.microsoft.com/office/drawing/2010/main" xmlns="" w="9525">
+                  <a14:hiddenLine xmlns="" xmlns:a14="http://schemas.microsoft.com/office/drawing/2010/main" w="9525">
                     <a:solidFill>
                       <a:srgbClr val="000000"/>
                     </a:solidFill>
@@ -10029,7 +10091,7 @@
               </a:ln>
               <a:extLst>
                 <a:ext uri="{91240B29-F687-4f45-9708-019B960494DF}">
-                  <a14:hiddenLine xmlns:a14="http://schemas.microsoft.com/office/drawing/2010/main" xmlns="" w="9525">
+                  <a14:hiddenLine xmlns="" xmlns:a14="http://schemas.microsoft.com/office/drawing/2010/main" w="9525">
                     <a:solidFill>
                       <a:srgbClr val="000000"/>
                     </a:solidFill>
@@ -10091,7 +10153,7 @@
               </a:ln>
               <a:extLst>
                 <a:ext uri="{91240B29-F687-4f45-9708-019B960494DF}">
-                  <a14:hiddenLine xmlns:a14="http://schemas.microsoft.com/office/drawing/2010/main" xmlns="" w="9525">
+                  <a14:hiddenLine xmlns="" xmlns:a14="http://schemas.microsoft.com/office/drawing/2010/main" w="9525">
                     <a:solidFill>
                       <a:srgbClr val="000000"/>
                     </a:solidFill>
@@ -10153,7 +10215,7 @@
               </a:ln>
               <a:extLst>
                 <a:ext uri="{91240B29-F687-4f45-9708-019B960494DF}">
-                  <a14:hiddenLine xmlns:a14="http://schemas.microsoft.com/office/drawing/2010/main" xmlns="" w="9525">
+                  <a14:hiddenLine xmlns="" xmlns:a14="http://schemas.microsoft.com/office/drawing/2010/main" w="9525">
                     <a:solidFill>
                       <a:srgbClr val="000000"/>
                     </a:solidFill>
@@ -10243,7 +10305,7 @@
               </a:ln>
               <a:extLst>
                 <a:ext uri="{91240B29-F687-4f45-9708-019B960494DF}">
-                  <a14:hiddenLine xmlns:a14="http://schemas.microsoft.com/office/drawing/2010/main" xmlns="" w="9525">
+                  <a14:hiddenLine xmlns="" xmlns:a14="http://schemas.microsoft.com/office/drawing/2010/main" w="9525">
                     <a:solidFill>
                       <a:srgbClr val="000000"/>
                     </a:solidFill>
@@ -10277,7 +10339,7 @@
               </a:ln>
               <a:extLst>
                 <a:ext uri="{91240B29-F687-4f45-9708-019B960494DF}">
-                  <a14:hiddenLine xmlns:a14="http://schemas.microsoft.com/office/drawing/2010/main" xmlns="" w="9525">
+                  <a14:hiddenLine xmlns="" xmlns:a14="http://schemas.microsoft.com/office/drawing/2010/main" w="9525">
                     <a:solidFill>
                       <a:srgbClr val="000000"/>
                     </a:solidFill>
@@ -10342,7 +10404,7 @@
               </a:ln>
               <a:extLst>
                 <a:ext uri="{91240B29-F687-4f45-9708-019B960494DF}">
-                  <a14:hiddenLine xmlns:a14="http://schemas.microsoft.com/office/drawing/2010/main" xmlns="" w="9525">
+                  <a14:hiddenLine xmlns="" xmlns:a14="http://schemas.microsoft.com/office/drawing/2010/main" w="9525">
                     <a:solidFill>
                       <a:srgbClr val="000000"/>
                     </a:solidFill>
@@ -10432,7 +10494,7 @@
               </a:ln>
               <a:extLst>
                 <a:ext uri="{91240B29-F687-4f45-9708-019B960494DF}">
-                  <a14:hiddenLine xmlns:a14="http://schemas.microsoft.com/office/drawing/2010/main" xmlns="" w="9525">
+                  <a14:hiddenLine xmlns="" xmlns:a14="http://schemas.microsoft.com/office/drawing/2010/main" w="9525">
                     <a:solidFill>
                       <a:srgbClr val="000000"/>
                     </a:solidFill>
@@ -10494,7 +10556,7 @@
               </a:ln>
               <a:extLst>
                 <a:ext uri="{91240B29-F687-4f45-9708-019B960494DF}">
-                  <a14:hiddenLine xmlns:a14="http://schemas.microsoft.com/office/drawing/2010/main" xmlns="" w="9525">
+                  <a14:hiddenLine xmlns="" xmlns:a14="http://schemas.microsoft.com/office/drawing/2010/main" w="9525">
                     <a:solidFill>
                       <a:srgbClr val="000000"/>
                     </a:solidFill>
@@ -10584,7 +10646,7 @@
               </a:ln>
               <a:extLst>
                 <a:ext uri="{91240B29-F687-4f45-9708-019B960494DF}">
-                  <a14:hiddenLine xmlns:a14="http://schemas.microsoft.com/office/drawing/2010/main" xmlns="" w="9525">
+                  <a14:hiddenLine xmlns="" xmlns:a14="http://schemas.microsoft.com/office/drawing/2010/main" w="9525">
                     <a:solidFill>
                       <a:srgbClr val="000000"/>
                     </a:solidFill>
@@ -10649,7 +10711,7 @@
               </a:ln>
               <a:extLst>
                 <a:ext uri="{91240B29-F687-4f45-9708-019B960494DF}">
-                  <a14:hiddenLine xmlns:a14="http://schemas.microsoft.com/office/drawing/2010/main" xmlns="" w="9525">
+                  <a14:hiddenLine xmlns="" xmlns:a14="http://schemas.microsoft.com/office/drawing/2010/main" w="9525">
                     <a:solidFill>
                       <a:srgbClr val="000000"/>
                     </a:solidFill>
@@ -10711,7 +10773,7 @@
               </a:ln>
               <a:extLst>
                 <a:ext uri="{91240B29-F687-4f45-9708-019B960494DF}">
-                  <a14:hiddenLine xmlns:a14="http://schemas.microsoft.com/office/drawing/2010/main" xmlns="" w="9525">
+                  <a14:hiddenLine xmlns="" xmlns:a14="http://schemas.microsoft.com/office/drawing/2010/main" w="9525">
                     <a:solidFill>
                       <a:srgbClr val="000000"/>
                     </a:solidFill>
@@ -10801,7 +10863,7 @@
               </a:ln>
               <a:extLst>
                 <a:ext uri="{91240B29-F687-4f45-9708-019B960494DF}">
-                  <a14:hiddenLine xmlns:a14="http://schemas.microsoft.com/office/drawing/2010/main" xmlns="" w="9525">
+                  <a14:hiddenLine xmlns="" xmlns:a14="http://schemas.microsoft.com/office/drawing/2010/main" w="9525">
                     <a:solidFill>
                       <a:srgbClr val="000000"/>
                     </a:solidFill>
@@ -10891,7 +10953,7 @@
               </a:ln>
               <a:extLst>
                 <a:ext uri="{91240B29-F687-4f45-9708-019B960494DF}">
-                  <a14:hiddenLine xmlns:a14="http://schemas.microsoft.com/office/drawing/2010/main" xmlns="" w="9525">
+                  <a14:hiddenLine xmlns="" xmlns:a14="http://schemas.microsoft.com/office/drawing/2010/main" w="9525">
                     <a:solidFill>
                       <a:srgbClr val="000000"/>
                     </a:solidFill>
@@ -10956,7 +11018,7 @@
               </a:ln>
               <a:extLst>
                 <a:ext uri="{91240B29-F687-4f45-9708-019B960494DF}">
-                  <a14:hiddenLine xmlns:a14="http://schemas.microsoft.com/office/drawing/2010/main" xmlns="" w="9525">
+                  <a14:hiddenLine xmlns="" xmlns:a14="http://schemas.microsoft.com/office/drawing/2010/main" w="9525">
                     <a:solidFill>
                       <a:srgbClr val="000000"/>
                     </a:solidFill>
@@ -11076,7 +11138,7 @@
               </a:ln>
               <a:extLst>
                 <a:ext uri="{91240B29-F687-4f45-9708-019B960494DF}">
-                  <a14:hiddenLine xmlns:a14="http://schemas.microsoft.com/office/drawing/2010/main" xmlns="" w="9525">
+                  <a14:hiddenLine xmlns="" xmlns:a14="http://schemas.microsoft.com/office/drawing/2010/main" w="9525">
                     <a:solidFill>
                       <a:srgbClr val="000000"/>
                     </a:solidFill>
@@ -11174,7 +11236,7 @@
               </a:ln>
               <a:extLst>
                 <a:ext uri="{91240B29-F687-4f45-9708-019B960494DF}">
-                  <a14:hiddenLine xmlns:a14="http://schemas.microsoft.com/office/drawing/2010/main" xmlns="" w="9525">
+                  <a14:hiddenLine xmlns="" xmlns:a14="http://schemas.microsoft.com/office/drawing/2010/main" w="9525">
                     <a:solidFill>
                       <a:srgbClr val="000000"/>
                     </a:solidFill>
@@ -11289,7 +11351,7 @@
               </a:ln>
               <a:extLst>
                 <a:ext uri="{91240B29-F687-4f45-9708-019B960494DF}">
-                  <a14:hiddenLine xmlns:a14="http://schemas.microsoft.com/office/drawing/2010/main" xmlns="" w="9525">
+                  <a14:hiddenLine xmlns="" xmlns:a14="http://schemas.microsoft.com/office/drawing/2010/main" w="9525">
                     <a:solidFill>
                       <a:srgbClr val="000000"/>
                     </a:solidFill>
@@ -11379,7 +11441,7 @@
               </a:ln>
               <a:extLst>
                 <a:ext uri="{91240B29-F687-4f45-9708-019B960494DF}">
-                  <a14:hiddenLine xmlns:a14="http://schemas.microsoft.com/office/drawing/2010/main" xmlns="" w="9525">
+                  <a14:hiddenLine xmlns="" xmlns:a14="http://schemas.microsoft.com/office/drawing/2010/main" w="9525">
                     <a:solidFill>
                       <a:srgbClr val="000000"/>
                     </a:solidFill>
@@ -11444,7 +11506,7 @@
               </a:ln>
               <a:extLst>
                 <a:ext uri="{91240B29-F687-4f45-9708-019B960494DF}">
-                  <a14:hiddenLine xmlns:a14="http://schemas.microsoft.com/office/drawing/2010/main" xmlns="" w="9525">
+                  <a14:hiddenLine xmlns="" xmlns:a14="http://schemas.microsoft.com/office/drawing/2010/main" w="9525">
                     <a:solidFill>
                       <a:srgbClr val="000000"/>
                     </a:solidFill>
@@ -11534,7 +11596,7 @@
               </a:ln>
               <a:extLst>
                 <a:ext uri="{91240B29-F687-4f45-9708-019B960494DF}">
-                  <a14:hiddenLine xmlns:a14="http://schemas.microsoft.com/office/drawing/2010/main" xmlns="" w="9525">
+                  <a14:hiddenLine xmlns="" xmlns:a14="http://schemas.microsoft.com/office/drawing/2010/main" w="9525">
                     <a:solidFill>
                       <a:srgbClr val="000000"/>
                     </a:solidFill>
@@ -11602,7 +11664,7 @@
               </a:ln>
               <a:extLst>
                 <a:ext uri="{91240B29-F687-4f45-9708-019B960494DF}">
-                  <a14:hiddenLine xmlns:a14="http://schemas.microsoft.com/office/drawing/2010/main" xmlns="" w="9525">
+                  <a14:hiddenLine xmlns="" xmlns:a14="http://schemas.microsoft.com/office/drawing/2010/main" w="9525">
                     <a:solidFill>
                       <a:srgbClr val="000000"/>
                     </a:solidFill>
@@ -11692,7 +11754,7 @@
               </a:ln>
               <a:extLst>
                 <a:ext uri="{91240B29-F687-4f45-9708-019B960494DF}">
-                  <a14:hiddenLine xmlns:a14="http://schemas.microsoft.com/office/drawing/2010/main" xmlns="" w="9525">
+                  <a14:hiddenLine xmlns="" xmlns:a14="http://schemas.microsoft.com/office/drawing/2010/main" w="9525">
                     <a:solidFill>
                       <a:srgbClr val="000000"/>
                     </a:solidFill>
@@ -11760,7 +11822,7 @@
               </a:ln>
               <a:extLst>
                 <a:ext uri="{91240B29-F687-4f45-9708-019B960494DF}">
-                  <a14:hiddenLine xmlns:a14="http://schemas.microsoft.com/office/drawing/2010/main" xmlns="" w="9525">
+                  <a14:hiddenLine xmlns="" xmlns:a14="http://schemas.microsoft.com/office/drawing/2010/main" w="9525">
                     <a:solidFill>
                       <a:srgbClr val="000000"/>
                     </a:solidFill>
@@ -11850,7 +11912,7 @@
               </a:ln>
               <a:extLst>
                 <a:ext uri="{91240B29-F687-4f45-9708-019B960494DF}">
-                  <a14:hiddenLine xmlns:a14="http://schemas.microsoft.com/office/drawing/2010/main" xmlns="" w="9525">
+                  <a14:hiddenLine xmlns="" xmlns:a14="http://schemas.microsoft.com/office/drawing/2010/main" w="9525">
                     <a:solidFill>
                       <a:srgbClr val="000000"/>
                     </a:solidFill>
@@ -11884,7 +11946,7 @@
               </a:ln>
               <a:extLst>
                 <a:ext uri="{91240B29-F687-4f45-9708-019B960494DF}">
-                  <a14:hiddenLine xmlns:a14="http://schemas.microsoft.com/office/drawing/2010/main" xmlns="" w="9525">
+                  <a14:hiddenLine xmlns="" xmlns:a14="http://schemas.microsoft.com/office/drawing/2010/main" w="9525">
                     <a:solidFill>
                       <a:srgbClr val="000000"/>
                     </a:solidFill>
@@ -12493,10 +12555,15 @@
             <p:ph type="subTitle" idx="1"/>
           </p:nvPr>
         </p:nvSpPr>
-        <p:spPr/>
+        <p:spPr>
+          <a:xfrm>
+            <a:off x="1876424" y="3602037"/>
+            <a:ext cx="8791575" cy="2522991"/>
+          </a:xfrm>
+        </p:spPr>
         <p:txBody>
           <a:bodyPr>
-            <a:normAutofit fontScale="62500" lnSpcReduction="20000"/>
+            <a:normAutofit fontScale="70000" lnSpcReduction="20000"/>
           </a:bodyPr>
           <a:lstStyle/>
           <a:p>
@@ -12548,6 +12615,37 @@
               </a:rPr>
               <a:t>Abhishek</a:t>
             </a:r>
+          </a:p>
+          <a:p>
+            <a:pPr algn="r"/>
+            <a:r>
+              <a:rPr lang="en-IN" b="1" dirty="0" err="1">
+                <a:latin typeface="Times New Roman" panose="02020603050405020304" pitchFamily="18" charset="0"/>
+                <a:cs typeface="Times New Roman" panose="02020603050405020304" pitchFamily="18" charset="0"/>
+              </a:rPr>
+              <a:t>Ayush</a:t>
+            </a:r>
+            <a:r>
+              <a:rPr lang="en-IN" b="1" dirty="0">
+                <a:latin typeface="Times New Roman" panose="02020603050405020304" pitchFamily="18" charset="0"/>
+                <a:cs typeface="Times New Roman" panose="02020603050405020304" pitchFamily="18" charset="0"/>
+              </a:rPr>
+              <a:t> Agarwal</a:t>
+            </a:r>
+          </a:p>
+          <a:p>
+            <a:pPr algn="r"/>
+            <a:r>
+              <a:rPr lang="en-IN" b="1" dirty="0" err="1">
+                <a:latin typeface="Times New Roman" panose="02020603050405020304" pitchFamily="18" charset="0"/>
+                <a:cs typeface="Times New Roman" panose="02020603050405020304" pitchFamily="18" charset="0"/>
+              </a:rPr>
+              <a:t>Sravani</a:t>
+            </a:r>
+            <a:endParaRPr lang="en-IN" b="1" dirty="0">
+              <a:latin typeface="Times New Roman" panose="02020603050405020304" pitchFamily="18" charset="0"/>
+              <a:cs typeface="Times New Roman" panose="02020603050405020304" pitchFamily="18" charset="0"/>
+            </a:endParaRPr>
           </a:p>
           <a:p>
             <a:pPr algn="r"/>
@@ -13380,6 +13478,123 @@
 </file>
 
 <file path=ppt/slides/slide8.xml><?xml version="1.0" encoding="utf-8"?>
+<p:sld xmlns:a="http://schemas.openxmlformats.org/drawingml/2006/main" xmlns:r="http://schemas.openxmlformats.org/officeDocument/2006/relationships" xmlns:p="http://schemas.openxmlformats.org/presentationml/2006/main">
+  <p:cSld>
+    <p:spTree>
+      <p:nvGrpSpPr>
+        <p:cNvPr id="1" name=""/>
+        <p:cNvGrpSpPr/>
+        <p:nvPr/>
+      </p:nvGrpSpPr>
+      <p:grpSpPr>
+        <a:xfrm>
+          <a:off x="0" y="0"/>
+          <a:ext cx="0" cy="0"/>
+          <a:chOff x="0" y="0"/>
+          <a:chExt cx="0" cy="0"/>
+        </a:xfrm>
+      </p:grpSpPr>
+      <p:sp>
+        <p:nvSpPr>
+          <p:cNvPr id="2" name="Title 1">
+            <a:extLst>
+              <a:ext uri="{FF2B5EF4-FFF2-40B4-BE49-F238E27FC236}">
+                <a16:creationId xmlns:a16="http://schemas.microsoft.com/office/drawing/2014/main" id="{61333A06-9A26-443C-A929-A58F9876ADE7}"/>
+              </a:ext>
+            </a:extLst>
+          </p:cNvPr>
+          <p:cNvSpPr>
+            <a:spLocks noGrp="1"/>
+          </p:cNvSpPr>
+          <p:nvPr>
+            <p:ph type="title"/>
+          </p:nvPr>
+        </p:nvSpPr>
+        <p:spPr>
+          <a:xfrm>
+            <a:off x="1141413" y="618518"/>
+            <a:ext cx="9905998" cy="847425"/>
+          </a:xfrm>
+        </p:spPr>
+        <p:txBody>
+          <a:bodyPr>
+            <a:normAutofit/>
+          </a:bodyPr>
+          <a:lstStyle/>
+          <a:p>
+            <a:r>
+              <a:rPr lang="en-US" sz="3200" b="1" dirty="0">
+                <a:latin typeface="Times New Roman" panose="02020603050405020304" pitchFamily="18" charset="0"/>
+                <a:cs typeface="Times New Roman" panose="02020603050405020304" pitchFamily="18" charset="0"/>
+              </a:rPr>
+              <a:t>Class Diagram of Address Class</a:t>
+            </a:r>
+          </a:p>
+        </p:txBody>
+      </p:sp>
+      <p:pic>
+        <p:nvPicPr>
+          <p:cNvPr id="1026" name="Picture 2">
+            <a:extLst>
+              <a:ext uri="{FF2B5EF4-FFF2-40B4-BE49-F238E27FC236}">
+                <a16:creationId xmlns:a16="http://schemas.microsoft.com/office/drawing/2014/main" id="{1745679B-FC18-4F2A-85C6-89FE6A41CD5E}"/>
+              </a:ext>
+            </a:extLst>
+          </p:cNvPr>
+          <p:cNvPicPr>
+            <a:picLocks noGrp="1" noChangeAspect="1" noChangeArrowheads="1"/>
+          </p:cNvPicPr>
+          <p:nvPr>
+            <p:ph idx="1"/>
+          </p:nvPr>
+        </p:nvPicPr>
+        <p:blipFill>
+          <a:blip r:embed="rId2">
+            <a:extLst>
+              <a:ext uri="{28A0092B-C50C-407E-A947-70E740481C1C}">
+                <a14:useLocalDpi xmlns:a14="http://schemas.microsoft.com/office/drawing/2010/main" val="0"/>
+              </a:ext>
+            </a:extLst>
+          </a:blip>
+          <a:srcRect/>
+          <a:stretch>
+            <a:fillRect/>
+          </a:stretch>
+        </p:blipFill>
+        <p:spPr bwMode="auto">
+          <a:xfrm>
+            <a:off x="1141413" y="1465943"/>
+            <a:ext cx="9905998" cy="4773539"/>
+          </a:xfrm>
+          <a:prstGeom prst="rect">
+            <a:avLst/>
+          </a:prstGeom>
+          <a:noFill/>
+          <a:extLst>
+            <a:ext uri="{909E8E84-426E-40DD-AFC4-6F175D3DCCD1}">
+              <a14:hiddenFill xmlns:a14="http://schemas.microsoft.com/office/drawing/2010/main">
+                <a:solidFill>
+                  <a:srgbClr val="FFFFFF"/>
+                </a:solidFill>
+              </a14:hiddenFill>
+            </a:ext>
+          </a:extLst>
+        </p:spPr>
+      </p:pic>
+    </p:spTree>
+    <p:extLst>
+      <p:ext uri="{BB962C8B-B14F-4D97-AF65-F5344CB8AC3E}">
+        <p14:creationId xmlns:p14="http://schemas.microsoft.com/office/powerpoint/2010/main" val="2023127618"/>
+      </p:ext>
+    </p:extLst>
+  </p:cSld>
+  <p:clrMapOvr>
+    <a:masterClrMapping/>
+  </p:clrMapOvr>
+</p:sld>
+</file>
+
+<file path=ppt/slides/slide9.xml><?xml version="1.0" encoding="utf-8"?>
 <p:sld xmlns:a="http://schemas.openxmlformats.org/drawingml/2006/main" xmlns:r="http://schemas.openxmlformats.org/officeDocument/2006/relationships" xmlns:p="http://schemas.openxmlformats.org/presentationml/2006/main">
   <p:cSld>
     <p:spTree>
@@ -13698,6 +13913,21 @@
 </file>
 
 <file path=customXml/item1.xml><?xml version="1.0" encoding="utf-8"?>
+<p:properties xmlns:p="http://schemas.microsoft.com/office/2006/metadata/properties" xmlns:xsi="http://www.w3.org/2001/XMLSchema-instance" xmlns:pc="http://schemas.microsoft.com/office/infopath/2007/PartnerControls">
+  <documentManagement/>
+</p:properties>
+</file>
+
+<file path=customXml/item2.xml><?xml version="1.0" encoding="utf-8"?>
+<?mso-contentType ?>
+<FormTemplates xmlns="http://schemas.microsoft.com/sharepoint/v3/contenttype/forms">
+  <Display>DocumentLibraryForm</Display>
+  <Edit>DocumentLibraryForm</Edit>
+  <New>DocumentLibraryForm</New>
+</FormTemplates>
+</file>
+
+<file path=customXml/item3.xml><?xml version="1.0" encoding="utf-8"?>
 <ct:contentTypeSchema xmlns:ct="http://schemas.microsoft.com/office/2006/metadata/contentType" xmlns:ma="http://schemas.microsoft.com/office/2006/metadata/properties/metaAttributes" ct:_="" ma:_="" ma:contentTypeName="Document" ma:contentTypeID="0x010100FC3EC6E82BA5F1488B001F849128D20B" ma:contentTypeVersion="10" ma:contentTypeDescription="Create a new document." ma:contentTypeScope="" ma:versionID="020918f8d88af972da61b33e11ec30cd">
   <xsd:schema xmlns:xsd="http://www.w3.org/2001/XMLSchema" xmlns:xs="http://www.w3.org/2001/XMLSchema" xmlns:p="http://schemas.microsoft.com/office/2006/metadata/properties" xmlns:ns3="05dee929-f352-4fc4-88d6-8470e3365306" targetNamespace="http://schemas.microsoft.com/office/2006/metadata/properties" ma:root="true" ma:fieldsID="ff83cffa19c7c71f9e553e6e45bb1cda" ns3:_="">
     <xsd:import namespace="05dee929-f352-4fc4-88d6-8470e3365306"/>
@@ -13881,22 +14111,31 @@
 </ct:contentTypeSchema>
 </file>
 
-<file path=customXml/item2.xml><?xml version="1.0" encoding="utf-8"?>
-<?mso-contentType ?>
-<FormTemplates xmlns="http://schemas.microsoft.com/sharepoint/v3/contenttype/forms">
-  <Display>DocumentLibraryForm</Display>
-  <Edit>DocumentLibraryForm</Edit>
-  <New>DocumentLibraryForm</New>
-</FormTemplates>
+<file path=customXml/itemProps1.xml><?xml version="1.0" encoding="utf-8"?>
+<ds:datastoreItem xmlns:ds="http://schemas.openxmlformats.org/officeDocument/2006/customXml" ds:itemID="{74D8516C-6775-4188-834D-D5D39F799929}">
+  <ds:schemaRefs>
+    <ds:schemaRef ds:uri="05dee929-f352-4fc4-88d6-8470e3365306"/>
+    <ds:schemaRef ds:uri="http://purl.org/dc/dcmitype/"/>
+    <ds:schemaRef ds:uri="http://purl.org/dc/elements/1.1/"/>
+    <ds:schemaRef ds:uri="http://schemas.openxmlformats.org/package/2006/metadata/core-properties"/>
+    <ds:schemaRef ds:uri="http://purl.org/dc/terms/"/>
+    <ds:schemaRef ds:uri="http://schemas.microsoft.com/office/2006/metadata/properties"/>
+    <ds:schemaRef ds:uri="http://schemas.microsoft.com/office/2006/documentManagement/types"/>
+    <ds:schemaRef ds:uri="http://schemas.microsoft.com/office/infopath/2007/PartnerControls"/>
+    <ds:schemaRef ds:uri="http://www.w3.org/XML/1998/namespace"/>
+  </ds:schemaRefs>
+</ds:datastoreItem>
 </file>
 
-<file path=customXml/item3.xml><?xml version="1.0" encoding="utf-8"?>
-<p:properties xmlns:p="http://schemas.microsoft.com/office/2006/metadata/properties" xmlns:xsi="http://www.w3.org/2001/XMLSchema-instance" xmlns:pc="http://schemas.microsoft.com/office/infopath/2007/PartnerControls">
-  <documentManagement/>
-</p:properties>
+<file path=customXml/itemProps2.xml><?xml version="1.0" encoding="utf-8"?>
+<ds:datastoreItem xmlns:ds="http://schemas.openxmlformats.org/officeDocument/2006/customXml" ds:itemID="{61324F0F-73AA-4A01-96BE-3BE6E3E38FFC}">
+  <ds:schemaRefs>
+    <ds:schemaRef ds:uri="http://schemas.microsoft.com/sharepoint/v3/contenttype/forms"/>
+  </ds:schemaRefs>
+</ds:datastoreItem>
 </file>
 
-<file path=customXml/itemProps1.xml><?xml version="1.0" encoding="utf-8"?>
+<file path=customXml/itemProps3.xml><?xml version="1.0" encoding="utf-8"?>
 <ds:datastoreItem xmlns:ds="http://schemas.openxmlformats.org/officeDocument/2006/customXml" ds:itemID="{0EBEE307-6D14-4B62-9767-840F9470D1D0}">
   <ds:schemaRefs>
     <ds:schemaRef ds:uri="http://schemas.microsoft.com/office/2006/metadata/contentType"/>
@@ -13912,28 +14151,4 @@
     <ds:schemaRef ds:uri="http://schemas.microsoft.com/internal/obd"/>
   </ds:schemaRefs>
 </ds:datastoreItem>
-</file>
-
-<file path=customXml/itemProps2.xml><?xml version="1.0" encoding="utf-8"?>
-<ds:datastoreItem xmlns:ds="http://schemas.openxmlformats.org/officeDocument/2006/customXml" ds:itemID="{61324F0F-73AA-4A01-96BE-3BE6E3E38FFC}">
-  <ds:schemaRefs>
-    <ds:schemaRef ds:uri="http://schemas.microsoft.com/sharepoint/v3/contenttype/forms"/>
-  </ds:schemaRefs>
-</ds:datastoreItem>
-</file>
-
-<file path=customXml/itemProps3.xml><?xml version="1.0" encoding="utf-8"?>
-<ds:datastoreItem xmlns:ds="http://schemas.openxmlformats.org/officeDocument/2006/customXml" ds:itemID="{74D8516C-6775-4188-834D-D5D39F799929}">
-  <ds:schemaRefs>
-    <ds:schemaRef ds:uri="http://schemas.microsoft.com/office/2006/metadata/properties"/>
-    <ds:schemaRef ds:uri="http://schemas.microsoft.com/office/2006/documentManagement/types"/>
-    <ds:schemaRef ds:uri="http://www.w3.org/XML/1998/namespace"/>
-    <ds:schemaRef ds:uri="http://purl.org/dc/elements/1.1/"/>
-    <ds:schemaRef ds:uri="http://purl.org/dc/terms/"/>
-    <ds:schemaRef ds:uri="http://schemas.microsoft.com/office/infopath/2007/PartnerControls"/>
-    <ds:schemaRef ds:uri="http://schemas.openxmlformats.org/package/2006/metadata/core-properties"/>
-    <ds:schemaRef ds:uri="05dee929-f352-4fc4-88d6-8470e3365306"/>
-    <ds:schemaRef ds:uri="http://purl.org/dc/dcmitype/"/>
-  </ds:schemaRefs>
-</ds:datastoreItem>
 </file>
</xml_diff>